<commit_message>
Added files and folders
</commit_message>
<xml_diff>
--- a/Database Administrator/Module5-Database Development/5.4-Database Constraints Unveiling the Limitations of SQL and NoSQL(2th-4p)/Database Constraints.pptx
+++ b/Database Administrator/Module5-Database Development/5.4-Database Constraints Unveiling the Limitations of SQL and NoSQL(2th-4p)/Database Constraints.pptx
@@ -515,6 +515,45 @@
     </pc:docChg>
   </pc:docChgLst>
   <pc:docChgLst>
+    <pc:chgData name="Krishna Kant Dubey" userId="cd28fa1e1902c48d" providerId="LiveId" clId="{7C4D63D3-B9B7-48B4-A008-9C5BB9CA59AA}"/>
+    <pc:docChg chg="modSld">
+      <pc:chgData name="Krishna Kant Dubey" userId="cd28fa1e1902c48d" providerId="LiveId" clId="{7C4D63D3-B9B7-48B4-A008-9C5BB9CA59AA}" dt="2025-08-08T12:26:03.214" v="4"/>
+      <pc:docMkLst>
+        <pc:docMk/>
+      </pc:docMkLst>
+      <pc:sldChg chg="modSp mod">
+        <pc:chgData name="Krishna Kant Dubey" userId="cd28fa1e1902c48d" providerId="LiveId" clId="{7C4D63D3-B9B7-48B4-A008-9C5BB9CA59AA}" dt="2025-08-08T12:25:22.761" v="2" actId="113"/>
+        <pc:sldMkLst>
+          <pc:docMk/>
+          <pc:sldMk cId="1080327146" sldId="256"/>
+        </pc:sldMkLst>
+        <pc:spChg chg="mod">
+          <ac:chgData name="Krishna Kant Dubey" userId="cd28fa1e1902c48d" providerId="LiveId" clId="{7C4D63D3-B9B7-48B4-A008-9C5BB9CA59AA}" dt="2025-08-08T12:25:22.761" v="2" actId="113"/>
+          <ac:spMkLst>
+            <pc:docMk/>
+            <pc:sldMk cId="1080327146" sldId="256"/>
+            <ac:spMk id="12" creationId="{941B6D05-14FE-733C-BADE-E07A8CDD1589}"/>
+          </ac:spMkLst>
+        </pc:spChg>
+      </pc:sldChg>
+      <pc:sldChg chg="modSp">
+        <pc:chgData name="Krishna Kant Dubey" userId="cd28fa1e1902c48d" providerId="LiveId" clId="{7C4D63D3-B9B7-48B4-A008-9C5BB9CA59AA}" dt="2025-08-08T12:26:03.214" v="4"/>
+        <pc:sldMkLst>
+          <pc:docMk/>
+          <pc:sldMk cId="2701513036" sldId="259"/>
+        </pc:sldMkLst>
+        <pc:spChg chg="mod">
+          <ac:chgData name="Krishna Kant Dubey" userId="cd28fa1e1902c48d" providerId="LiveId" clId="{7C4D63D3-B9B7-48B4-A008-9C5BB9CA59AA}" dt="2025-08-08T12:26:03.214" v="4"/>
+          <ac:spMkLst>
+            <pc:docMk/>
+            <pc:sldMk cId="2701513036" sldId="259"/>
+            <ac:spMk id="13" creationId="{459108AF-66D9-CD3C-DDCE-0CFFD70B496D}"/>
+          </ac:spMkLst>
+        </pc:spChg>
+      </pc:sldChg>
+    </pc:docChg>
+  </pc:docChgLst>
+  <pc:docChgLst>
     <pc:chgData name="Krishna Kant Dubey" userId="cd28fa1e1902c48d" providerId="LiveId" clId="{F3C5F2BA-F452-4AB9-BD00-EA8AA37CF020}"/>
     <pc:docChg chg="undo custSel addSld modSld">
       <pc:chgData name="Krishna Kant Dubey" userId="cd28fa1e1902c48d" providerId="LiveId" clId="{F3C5F2BA-F452-4AB9-BD00-EA8AA37CF020}" dt="2025-08-08T09:39:58.203" v="356" actId="20577"/>
@@ -1540,21 +1579,6 @@
       <pc:docMkLst>
         <pc:docMk/>
       </pc:docMkLst>
-      <pc:sldChg chg="modSp mod">
-        <pc:chgData name="Krishna Kant Dubey" userId="cd28fa1e1902c48d" providerId="LiveId" clId="{58D190E9-1125-499B-8C31-6A847451639F}" dt="2025-08-05T11:43:08.803" v="2" actId="207"/>
-        <pc:sldMkLst>
-          <pc:docMk/>
-          <pc:sldMk cId="1080327146" sldId="256"/>
-        </pc:sldMkLst>
-        <pc:spChg chg="mod">
-          <ac:chgData name="Krishna Kant Dubey" userId="cd28fa1e1902c48d" providerId="LiveId" clId="{58D190E9-1125-499B-8C31-6A847451639F}" dt="2025-08-05T11:43:08.803" v="2" actId="207"/>
-          <ac:spMkLst>
-            <pc:docMk/>
-            <pc:sldMk cId="1080327146" sldId="256"/>
-            <ac:spMk id="12" creationId="{941B6D05-14FE-733C-BADE-E07A8CDD1589}"/>
-          </ac:spMkLst>
-        </pc:spChg>
-      </pc:sldChg>
       <pc:sldChg chg="modSp mod">
         <pc:chgData name="Krishna Kant Dubey" userId="cd28fa1e1902c48d" providerId="LiveId" clId="{58D190E9-1125-499B-8C31-6A847451639F}" dt="2025-08-05T11:45:27.352" v="9" actId="113"/>
         <pc:sldMkLst>
@@ -5556,7 +5580,7 @@
                   <a:srgbClr val="C00000"/>
                 </a:solidFill>
               </a:rPr>
-              <a:t>Strategic Database Selection: Matching Types with Analysis Needs</a:t>
+              <a:t>Database Constraints: Unveiling the Limitations of SQL and NoSQL</a:t>
             </a:r>
             <a:endParaRPr lang="en-IN" b="1" dirty="0">
               <a:solidFill>
@@ -5710,12 +5734,8 @@
               <a:buNone/>
             </a:pPr>
             <a:r>
-              <a:rPr lang="en-US" b="1" dirty="0">
-                <a:solidFill>
-                  <a:srgbClr val="002060"/>
-                </a:solidFill>
-              </a:rPr>
-              <a:t>Discuss methods to select the right database type, ensuring alignment with analysis requirements and optimizing database performance for AI Database Administration</a:t>
+              <a:rPr lang="en-US"/>
+              <a:t>Describe the limitations of SQL and NoSQL databases, understanding the constraints and challenges associated with each database type in the</a:t>
             </a:r>
             <a:endParaRPr lang="en-IN" b="1" dirty="0">
               <a:solidFill>

</xml_diff>